<commit_message>
fixed code and restructured files
</commit_message>
<xml_diff>
--- a/Figures/All_figs_in_text.pptx
+++ b/Figures/All_figs_in_text.pptx
@@ -206,7 +206,7 @@
           <a:p>
             <a:fld id="{8AE731BB-F939-4C66-9F0B-C29D2DEABF15}" type="datetimeFigureOut">
               <a:rPr lang="en-US" smtClean="0"/>
-              <a:t>10/9/2023</a:t>
+              <a:t>1/9/2024</a:t>
             </a:fld>
             <a:endParaRPr lang="en-US"/>
           </a:p>
@@ -1065,7 +1065,7 @@
           <a:p>
             <a:fld id="{6FA08D01-D69F-4A5A-AB38-D270A191E98A}" type="datetimeFigureOut">
               <a:rPr lang="en-US" smtClean="0"/>
-              <a:t>10/9/2023</a:t>
+              <a:t>1/9/2024</a:t>
             </a:fld>
             <a:endParaRPr lang="en-US"/>
           </a:p>
@@ -1235,7 +1235,7 @@
           <a:p>
             <a:fld id="{6FA08D01-D69F-4A5A-AB38-D270A191E98A}" type="datetimeFigureOut">
               <a:rPr lang="en-US" smtClean="0"/>
-              <a:t>10/9/2023</a:t>
+              <a:t>1/9/2024</a:t>
             </a:fld>
             <a:endParaRPr lang="en-US"/>
           </a:p>
@@ -1415,7 +1415,7 @@
           <a:p>
             <a:fld id="{6FA08D01-D69F-4A5A-AB38-D270A191E98A}" type="datetimeFigureOut">
               <a:rPr lang="en-US" smtClean="0"/>
-              <a:t>10/9/2023</a:t>
+              <a:t>1/9/2024</a:t>
             </a:fld>
             <a:endParaRPr lang="en-US"/>
           </a:p>
@@ -1607,7 +1607,7 @@
           <a:p>
             <a:fld id="{A8B27BE4-E27A-41D6-9DF3-963E3EE331C4}" type="datetimeFigureOut">
               <a:rPr lang="en-US" smtClean="0"/>
-              <a:t>10/9/2023</a:t>
+              <a:t>1/9/2024</a:t>
             </a:fld>
             <a:endParaRPr lang="en-US"/>
           </a:p>
@@ -1777,7 +1777,7 @@
           <a:p>
             <a:fld id="{A8B27BE4-E27A-41D6-9DF3-963E3EE331C4}" type="datetimeFigureOut">
               <a:rPr lang="en-US" smtClean="0"/>
-              <a:t>10/9/2023</a:t>
+              <a:t>1/9/2024</a:t>
             </a:fld>
             <a:endParaRPr lang="en-US"/>
           </a:p>
@@ -2021,7 +2021,7 @@
           <a:p>
             <a:fld id="{A8B27BE4-E27A-41D6-9DF3-963E3EE331C4}" type="datetimeFigureOut">
               <a:rPr lang="en-US" smtClean="0"/>
-              <a:t>10/9/2023</a:t>
+              <a:t>1/9/2024</a:t>
             </a:fld>
             <a:endParaRPr lang="en-US"/>
           </a:p>
@@ -2253,7 +2253,7 @@
           <a:p>
             <a:fld id="{A8B27BE4-E27A-41D6-9DF3-963E3EE331C4}" type="datetimeFigureOut">
               <a:rPr lang="en-US" smtClean="0"/>
-              <a:t>10/9/2023</a:t>
+              <a:t>1/9/2024</a:t>
             </a:fld>
             <a:endParaRPr lang="en-US"/>
           </a:p>
@@ -2620,7 +2620,7 @@
           <a:p>
             <a:fld id="{A8B27BE4-E27A-41D6-9DF3-963E3EE331C4}" type="datetimeFigureOut">
               <a:rPr lang="en-US" smtClean="0"/>
-              <a:t>10/9/2023</a:t>
+              <a:t>1/9/2024</a:t>
             </a:fld>
             <a:endParaRPr lang="en-US"/>
           </a:p>
@@ -2738,7 +2738,7 @@
           <a:p>
             <a:fld id="{A8B27BE4-E27A-41D6-9DF3-963E3EE331C4}" type="datetimeFigureOut">
               <a:rPr lang="en-US" smtClean="0"/>
-              <a:t>10/9/2023</a:t>
+              <a:t>1/9/2024</a:t>
             </a:fld>
             <a:endParaRPr lang="en-US"/>
           </a:p>
@@ -2833,7 +2833,7 @@
           <a:p>
             <a:fld id="{A8B27BE4-E27A-41D6-9DF3-963E3EE331C4}" type="datetimeFigureOut">
               <a:rPr lang="en-US" smtClean="0"/>
-              <a:t>10/9/2023</a:t>
+              <a:t>1/9/2024</a:t>
             </a:fld>
             <a:endParaRPr lang="en-US"/>
           </a:p>
@@ -3110,7 +3110,7 @@
           <a:p>
             <a:fld id="{A8B27BE4-E27A-41D6-9DF3-963E3EE331C4}" type="datetimeFigureOut">
               <a:rPr lang="en-US" smtClean="0"/>
-              <a:t>10/9/2023</a:t>
+              <a:t>1/9/2024</a:t>
             </a:fld>
             <a:endParaRPr lang="en-US"/>
           </a:p>
@@ -3280,7 +3280,7 @@
           <a:p>
             <a:fld id="{6FA08D01-D69F-4A5A-AB38-D270A191E98A}" type="datetimeFigureOut">
               <a:rPr lang="en-US" smtClean="0"/>
-              <a:t>10/9/2023</a:t>
+              <a:t>1/9/2024</a:t>
             </a:fld>
             <a:endParaRPr lang="en-US"/>
           </a:p>
@@ -3537,7 +3537,7 @@
           <a:p>
             <a:fld id="{A8B27BE4-E27A-41D6-9DF3-963E3EE331C4}" type="datetimeFigureOut">
               <a:rPr lang="en-US" smtClean="0"/>
-              <a:t>10/9/2023</a:t>
+              <a:t>1/9/2024</a:t>
             </a:fld>
             <a:endParaRPr lang="en-US"/>
           </a:p>
@@ -3707,7 +3707,7 @@
           <a:p>
             <a:fld id="{A8B27BE4-E27A-41D6-9DF3-963E3EE331C4}" type="datetimeFigureOut">
               <a:rPr lang="en-US" smtClean="0"/>
-              <a:t>10/9/2023</a:t>
+              <a:t>1/9/2024</a:t>
             </a:fld>
             <a:endParaRPr lang="en-US"/>
           </a:p>
@@ -3887,7 +3887,7 @@
           <a:p>
             <a:fld id="{A8B27BE4-E27A-41D6-9DF3-963E3EE331C4}" type="datetimeFigureOut">
               <a:rPr lang="en-US" smtClean="0"/>
-              <a:t>10/9/2023</a:t>
+              <a:t>1/9/2024</a:t>
             </a:fld>
             <a:endParaRPr lang="en-US"/>
           </a:p>
@@ -4131,7 +4131,7 @@
           <a:p>
             <a:fld id="{6FA08D01-D69F-4A5A-AB38-D270A191E98A}" type="datetimeFigureOut">
               <a:rPr lang="en-US" smtClean="0"/>
-              <a:t>10/9/2023</a:t>
+              <a:t>1/9/2024</a:t>
             </a:fld>
             <a:endParaRPr lang="en-US"/>
           </a:p>
@@ -4363,7 +4363,7 @@
           <a:p>
             <a:fld id="{6FA08D01-D69F-4A5A-AB38-D270A191E98A}" type="datetimeFigureOut">
               <a:rPr lang="en-US" smtClean="0"/>
-              <a:t>10/9/2023</a:t>
+              <a:t>1/9/2024</a:t>
             </a:fld>
             <a:endParaRPr lang="en-US"/>
           </a:p>
@@ -4730,7 +4730,7 @@
           <a:p>
             <a:fld id="{6FA08D01-D69F-4A5A-AB38-D270A191E98A}" type="datetimeFigureOut">
               <a:rPr lang="en-US" smtClean="0"/>
-              <a:t>10/9/2023</a:t>
+              <a:t>1/9/2024</a:t>
             </a:fld>
             <a:endParaRPr lang="en-US"/>
           </a:p>
@@ -4848,7 +4848,7 @@
           <a:p>
             <a:fld id="{6FA08D01-D69F-4A5A-AB38-D270A191E98A}" type="datetimeFigureOut">
               <a:rPr lang="en-US" smtClean="0"/>
-              <a:t>10/9/2023</a:t>
+              <a:t>1/9/2024</a:t>
             </a:fld>
             <a:endParaRPr lang="en-US"/>
           </a:p>
@@ -4943,7 +4943,7 @@
           <a:p>
             <a:fld id="{6FA08D01-D69F-4A5A-AB38-D270A191E98A}" type="datetimeFigureOut">
               <a:rPr lang="en-US" smtClean="0"/>
-              <a:t>10/9/2023</a:t>
+              <a:t>1/9/2024</a:t>
             </a:fld>
             <a:endParaRPr lang="en-US"/>
           </a:p>
@@ -5220,7 +5220,7 @@
           <a:p>
             <a:fld id="{6FA08D01-D69F-4A5A-AB38-D270A191E98A}" type="datetimeFigureOut">
               <a:rPr lang="en-US" smtClean="0"/>
-              <a:t>10/9/2023</a:t>
+              <a:t>1/9/2024</a:t>
             </a:fld>
             <a:endParaRPr lang="en-US"/>
           </a:p>
@@ -5477,7 +5477,7 @@
           <a:p>
             <a:fld id="{6FA08D01-D69F-4A5A-AB38-D270A191E98A}" type="datetimeFigureOut">
               <a:rPr lang="en-US" smtClean="0"/>
-              <a:t>10/9/2023</a:t>
+              <a:t>1/9/2024</a:t>
             </a:fld>
             <a:endParaRPr lang="en-US"/>
           </a:p>
@@ -5690,7 +5690,7 @@
           <a:p>
             <a:fld id="{6FA08D01-D69F-4A5A-AB38-D270A191E98A}" type="datetimeFigureOut">
               <a:rPr lang="en-US" smtClean="0"/>
-              <a:t>10/9/2023</a:t>
+              <a:t>1/9/2024</a:t>
             </a:fld>
             <a:endParaRPr lang="en-US"/>
           </a:p>
@@ -6230,7 +6230,7 @@
           <a:p>
             <a:fld id="{A8B27BE4-E27A-41D6-9DF3-963E3EE331C4}" type="datetimeFigureOut">
               <a:rPr lang="en-US" smtClean="0"/>
-              <a:t>10/9/2023</a:t>
+              <a:t>1/9/2024</a:t>
             </a:fld>
             <a:endParaRPr lang="en-US"/>
           </a:p>
@@ -7099,16 +7099,15 @@
           </p:cNvPicPr>
           <p:nvPr/>
         </p:nvPicPr>
-        <p:blipFill>
+        <p:blipFill rotWithShape="1">
           <a:blip r:embed="rId3"/>
-          <a:stretch>
-            <a:fillRect/>
-          </a:stretch>
+          <a:srcRect l="4567"/>
+          <a:stretch/>
         </p:blipFill>
         <p:spPr>
           <a:xfrm>
-            <a:off x="5258790" y="2445964"/>
-            <a:ext cx="5116763" cy="3421657"/>
+            <a:off x="5376672" y="2445964"/>
+            <a:ext cx="4883057" cy="3421657"/>
           </a:xfrm>
           <a:prstGeom prst="rect">
             <a:avLst/>
@@ -7227,14 +7226,14 @@
           <a:p>
             <a:pPr algn="ctr"/>
             <a:r>
-              <a:rPr lang="en-US" sz="1400" dirty="0">
+              <a:rPr lang="en-US" sz="1400" i="1" dirty="0">
                 <a:latin typeface="Arial" panose="020B0604020202020204" pitchFamily="34" charset="0"/>
                 <a:cs typeface="Arial" panose="020B0604020202020204" pitchFamily="34" charset="0"/>
               </a:rPr>
               <a:t>A</a:t>
             </a:r>
             <a:r>
-              <a:rPr lang="en-US" sz="1400" baseline="-25000" dirty="0">
+              <a:rPr lang="en-US" sz="1400" i="1" baseline="-25000" dirty="0">
                 <a:latin typeface="Arial" panose="020B0604020202020204" pitchFamily="34" charset="0"/>
                 <a:cs typeface="Arial" panose="020B0604020202020204" pitchFamily="34" charset="0"/>
               </a:rPr>
@@ -7343,14 +7342,14 @@
           <a:p>
             <a:pPr algn="ctr"/>
             <a:r>
-              <a:rPr lang="en-US" sz="1400" dirty="0">
+              <a:rPr lang="en-US" sz="1400" i="1" dirty="0">
                 <a:latin typeface="Arial" panose="020B0604020202020204" pitchFamily="34" charset="0"/>
                 <a:cs typeface="Arial" panose="020B0604020202020204" pitchFamily="34" charset="0"/>
               </a:rPr>
               <a:t>C</a:t>
             </a:r>
             <a:r>
-              <a:rPr lang="en-US" sz="1400" baseline="-25000" dirty="0">
+              <a:rPr lang="en-US" sz="1400" i="1" baseline="-25000" dirty="0">
                 <a:latin typeface="Arial" panose="020B0604020202020204" pitchFamily="34" charset="0"/>
                 <a:cs typeface="Arial" panose="020B0604020202020204" pitchFamily="34" charset="0"/>
               </a:rPr>
@@ -7408,7 +7407,7 @@
         </p:nvSpPr>
         <p:spPr>
           <a:xfrm>
-            <a:off x="6220453" y="5597169"/>
+            <a:off x="6104629" y="5597169"/>
             <a:ext cx="2174033" cy="307777"/>
           </a:xfrm>
           <a:prstGeom prst="rect">
@@ -7426,14 +7425,14 @@
           <a:p>
             <a:pPr algn="ctr"/>
             <a:r>
-              <a:rPr lang="en-US" sz="1400" dirty="0">
+              <a:rPr lang="en-US" sz="1400" i="1" dirty="0">
                 <a:latin typeface="Arial" panose="020B0604020202020204" pitchFamily="34" charset="0"/>
                 <a:cs typeface="Arial" panose="020B0604020202020204" pitchFamily="34" charset="0"/>
               </a:rPr>
               <a:t>C</a:t>
             </a:r>
             <a:r>
-              <a:rPr lang="en-US" sz="1400" baseline="-25000" dirty="0">
+              <a:rPr lang="en-US" sz="1400" i="1" baseline="-25000" dirty="0">
                 <a:latin typeface="Arial" panose="020B0604020202020204" pitchFamily="34" charset="0"/>
                 <a:cs typeface="Arial" panose="020B0604020202020204" pitchFamily="34" charset="0"/>
               </a:rPr>
@@ -7550,7 +7549,7 @@
         </p:nvSpPr>
         <p:spPr>
           <a:xfrm>
-            <a:off x="6312048" y="2440551"/>
+            <a:off x="6196224" y="2440551"/>
             <a:ext cx="2412075" cy="523220"/>
           </a:xfrm>
           <a:prstGeom prst="rect">
@@ -7597,122 +7596,6 @@
             <a:endParaRPr lang="en-US" sz="1400" dirty="0">
               <a:latin typeface="Times New Roman" panose="02020603050405020304" pitchFamily="18" charset="0"/>
               <a:cs typeface="Times New Roman" panose="02020603050405020304" pitchFamily="18" charset="0"/>
-            </a:endParaRPr>
-          </a:p>
-        </p:txBody>
-      </p:sp>
-      <p:sp>
-        <p:nvSpPr>
-          <p:cNvPr id="5" name="TextBox 4">
-            <a:extLst>
-              <a:ext uri="{FF2B5EF4-FFF2-40B4-BE49-F238E27FC236}">
-                <a16:creationId xmlns:a16="http://schemas.microsoft.com/office/drawing/2014/main" id="{87E395E3-11F1-806C-705D-A3553826AE4C}"/>
-              </a:ext>
-            </a:extLst>
-          </p:cNvPr>
-          <p:cNvSpPr txBox="1"/>
-          <p:nvPr/>
-        </p:nvSpPr>
-        <p:spPr>
-          <a:xfrm rot="16200000">
-            <a:off x="4479943" y="3998127"/>
-            <a:ext cx="1769165" cy="307777"/>
-          </a:xfrm>
-          <a:prstGeom prst="rect">
-            <a:avLst/>
-          </a:prstGeom>
-          <a:solidFill>
-            <a:schemeClr val="bg1"/>
-          </a:solidFill>
-        </p:spPr>
-        <p:txBody>
-          <a:bodyPr wrap="square" rtlCol="0">
-            <a:spAutoFit/>
-          </a:bodyPr>
-          <a:lstStyle/>
-          <a:p>
-            <a:pPr algn="ctr"/>
-            <a:r>
-              <a:rPr lang="en-US" sz="1400" dirty="0">
-                <a:latin typeface="Arial" panose="020B0604020202020204" pitchFamily="34" charset="0"/>
-                <a:cs typeface="Arial" panose="020B0604020202020204" pitchFamily="34" charset="0"/>
-              </a:rPr>
-              <a:t>A</a:t>
-            </a:r>
-            <a:r>
-              <a:rPr lang="en-US" sz="1400" baseline="-25000" dirty="0">
-                <a:latin typeface="Arial" panose="020B0604020202020204" pitchFamily="34" charset="0"/>
-                <a:cs typeface="Arial" panose="020B0604020202020204" pitchFamily="34" charset="0"/>
-              </a:rPr>
-              <a:t>net</a:t>
-            </a:r>
-            <a:r>
-              <a:rPr lang="en-US" sz="1400" dirty="0">
-                <a:latin typeface="Arial" panose="020B0604020202020204" pitchFamily="34" charset="0"/>
-                <a:cs typeface="Arial" panose="020B0604020202020204" pitchFamily="34" charset="0"/>
-              </a:rPr>
-              <a:t> (</a:t>
-            </a:r>
-            <a:r>
-              <a:rPr lang="el-GR" sz="1400" dirty="0">
-                <a:latin typeface="Arial" panose="020B0604020202020204" pitchFamily="34" charset="0"/>
-                <a:cs typeface="Arial" panose="020B0604020202020204" pitchFamily="34" charset="0"/>
-              </a:rPr>
-              <a:t>μ</a:t>
-            </a:r>
-            <a:r>
-              <a:rPr lang="en-US" sz="1400" dirty="0">
-                <a:solidFill>
-                  <a:srgbClr val="000000"/>
-                </a:solidFill>
-                <a:latin typeface="Arial" panose="020B0604020202020204" pitchFamily="34" charset="0"/>
-                <a:cs typeface="Arial" panose="020B0604020202020204" pitchFamily="34" charset="0"/>
-              </a:rPr>
-              <a:t>mol m</a:t>
-            </a:r>
-            <a:r>
-              <a:rPr lang="en-US" sz="1400" baseline="30000" dirty="0">
-                <a:solidFill>
-                  <a:srgbClr val="000000"/>
-                </a:solidFill>
-                <a:latin typeface="Arial" panose="020B0604020202020204" pitchFamily="34" charset="0"/>
-                <a:cs typeface="Arial" panose="020B0604020202020204" pitchFamily="34" charset="0"/>
-              </a:rPr>
-              <a:t>-2</a:t>
-            </a:r>
-            <a:r>
-              <a:rPr lang="en-US" sz="1400" dirty="0">
-                <a:solidFill>
-                  <a:srgbClr val="000000"/>
-                </a:solidFill>
-                <a:latin typeface="Arial" panose="020B0604020202020204" pitchFamily="34" charset="0"/>
-                <a:cs typeface="Arial" panose="020B0604020202020204" pitchFamily="34" charset="0"/>
-              </a:rPr>
-              <a:t> s</a:t>
-            </a:r>
-            <a:r>
-              <a:rPr lang="en-US" sz="1400" baseline="30000" dirty="0">
-                <a:solidFill>
-                  <a:srgbClr val="000000"/>
-                </a:solidFill>
-                <a:latin typeface="Arial" panose="020B0604020202020204" pitchFamily="34" charset="0"/>
-                <a:cs typeface="Arial" panose="020B0604020202020204" pitchFamily="34" charset="0"/>
-              </a:rPr>
-              <a:t>-1</a:t>
-            </a:r>
-            <a:r>
-              <a:rPr lang="en-US" sz="1400" dirty="0">
-                <a:solidFill>
-                  <a:srgbClr val="000000"/>
-                </a:solidFill>
-                <a:latin typeface="Arial" panose="020B0604020202020204" pitchFamily="34" charset="0"/>
-                <a:cs typeface="Arial" panose="020B0604020202020204" pitchFamily="34" charset="0"/>
-              </a:rPr>
-              <a:t>)</a:t>
-            </a:r>
-            <a:endParaRPr lang="en-US" sz="1400" dirty="0">
-              <a:latin typeface="Arial" panose="020B0604020202020204" pitchFamily="34" charset="0"/>
-              <a:cs typeface="Arial" panose="020B0604020202020204" pitchFamily="34" charset="0"/>
             </a:endParaRPr>
           </a:p>
         </p:txBody>

</xml_diff>